<commit_message>
svd_img updated in ppt
</commit_message>
<xml_diff>
--- a/Klasifikator znameki.pptx
+++ b/Klasifikator znameki.pptx
@@ -300,7 +300,7 @@
           <a:p>
             <a:fld id="{3D60341B-96CE-479C-8E05-0D4B76A2A9EA}" type="datetimeFigureOut">
               <a:rPr lang="hr-HR" smtClean="0"/>
-              <a:t>9.9.2025.</a:t>
+              <a:t>16.9.2025.</a:t>
             </a:fld>
             <a:endParaRPr lang="hr-HR"/>
           </a:p>
@@ -630,7 +630,7 @@
           <a:p>
             <a:fld id="{3D60341B-96CE-479C-8E05-0D4B76A2A9EA}" type="datetimeFigureOut">
               <a:rPr lang="hr-HR" smtClean="0"/>
-              <a:t>9.9.2025.</a:t>
+              <a:t>16.9.2025.</a:t>
             </a:fld>
             <a:endParaRPr lang="hr-HR"/>
           </a:p>
@@ -810,7 +810,7 @@
           <a:p>
             <a:fld id="{3D60341B-96CE-479C-8E05-0D4B76A2A9EA}" type="datetimeFigureOut">
               <a:rPr lang="hr-HR" smtClean="0"/>
-              <a:t>9.9.2025.</a:t>
+              <a:t>16.9.2025.</a:t>
             </a:fld>
             <a:endParaRPr lang="hr-HR"/>
           </a:p>
@@ -980,7 +980,7 @@
           <a:p>
             <a:fld id="{3D60341B-96CE-479C-8E05-0D4B76A2A9EA}" type="datetimeFigureOut">
               <a:rPr lang="hr-HR" smtClean="0"/>
-              <a:t>9.9.2025.</a:t>
+              <a:t>16.9.2025.</a:t>
             </a:fld>
             <a:endParaRPr lang="hr-HR"/>
           </a:p>
@@ -1257,7 +1257,7 @@
           <a:p>
             <a:fld id="{3D60341B-96CE-479C-8E05-0D4B76A2A9EA}" type="datetimeFigureOut">
               <a:rPr lang="hr-HR" smtClean="0"/>
-              <a:t>9.9.2025.</a:t>
+              <a:t>16.9.2025.</a:t>
             </a:fld>
             <a:endParaRPr lang="hr-HR"/>
           </a:p>
@@ -1651,7 +1651,7 @@
           <a:p>
             <a:fld id="{3D60341B-96CE-479C-8E05-0D4B76A2A9EA}" type="datetimeFigureOut">
               <a:rPr lang="hr-HR" smtClean="0"/>
-              <a:t>9.9.2025.</a:t>
+              <a:t>16.9.2025.</a:t>
             </a:fld>
             <a:endParaRPr lang="hr-HR"/>
           </a:p>
@@ -2128,7 +2128,7 @@
           <a:p>
             <a:fld id="{3D60341B-96CE-479C-8E05-0D4B76A2A9EA}" type="datetimeFigureOut">
               <a:rPr lang="hr-HR" smtClean="0"/>
-              <a:t>9.9.2025.</a:t>
+              <a:t>16.9.2025.</a:t>
             </a:fld>
             <a:endParaRPr lang="hr-HR"/>
           </a:p>
@@ -2246,7 +2246,7 @@
           <a:p>
             <a:fld id="{3D60341B-96CE-479C-8E05-0D4B76A2A9EA}" type="datetimeFigureOut">
               <a:rPr lang="hr-HR" smtClean="0"/>
-              <a:t>9.9.2025.</a:t>
+              <a:t>16.9.2025.</a:t>
             </a:fld>
             <a:endParaRPr lang="hr-HR"/>
           </a:p>
@@ -2341,7 +2341,7 @@
           <a:p>
             <a:fld id="{3D60341B-96CE-479C-8E05-0D4B76A2A9EA}" type="datetimeFigureOut">
               <a:rPr lang="hr-HR" smtClean="0"/>
-              <a:t>9.9.2025.</a:t>
+              <a:t>16.9.2025.</a:t>
             </a:fld>
             <a:endParaRPr lang="hr-HR"/>
           </a:p>
@@ -2687,7 +2687,7 @@
           <a:p>
             <a:fld id="{3D60341B-96CE-479C-8E05-0D4B76A2A9EA}" type="datetimeFigureOut">
               <a:rPr lang="hr-HR" smtClean="0"/>
-              <a:t>9.9.2025.</a:t>
+              <a:t>16.9.2025.</a:t>
             </a:fld>
             <a:endParaRPr lang="hr-HR"/>
           </a:p>
@@ -3075,7 +3075,7 @@
           <a:p>
             <a:fld id="{3D60341B-96CE-479C-8E05-0D4B76A2A9EA}" type="datetimeFigureOut">
               <a:rPr lang="hr-HR" smtClean="0"/>
-              <a:t>9.9.2025.</a:t>
+              <a:t>16.9.2025.</a:t>
             </a:fld>
             <a:endParaRPr lang="hr-HR"/>
           </a:p>
@@ -3353,7 +3353,7 @@
           <a:p>
             <a:fld id="{3D60341B-96CE-479C-8E05-0D4B76A2A9EA}" type="datetimeFigureOut">
               <a:rPr lang="hr-HR" smtClean="0"/>
-              <a:t>9.9.2025.</a:t>
+              <a:t>16.9.2025.</a:t>
             </a:fld>
             <a:endParaRPr lang="hr-HR"/>
           </a:p>
@@ -5647,10 +5647,10 @@
       </p:sp>
       <p:pic>
         <p:nvPicPr>
-          <p:cNvPr id="7" name="Slika 6" descr="Slika na kojoj se prikazuje tekst, snimka zaslona, logotip, Font&#10;&#10;Sadržaj generiran uz AI možda nije točan.">
+          <p:cNvPr id="4" name="Slika 3" descr="Slika na kojoj se prikazuje tekst, snimka zaslona, Font, broj&#10;&#10;Sadržaj generiran uz AI možda nije točan.">
             <a:extLst>
               <a:ext uri="{FF2B5EF4-FFF2-40B4-BE49-F238E27FC236}">
-                <a16:creationId xmlns:a16="http://schemas.microsoft.com/office/drawing/2014/main" id="{81F6CE41-CE30-89B9-4130-2827F11AFD20}"/>
+                <a16:creationId xmlns:a16="http://schemas.microsoft.com/office/drawing/2014/main" id="{BA65A7F5-C729-F453-4401-8BE2C0A85B51}"/>
               </a:ext>
             </a:extLst>
           </p:cNvPr>
@@ -5667,15 +5667,15 @@
               </a:ext>
             </a:extLst>
           </a:blip>
-          <a:srcRect t="37814" r="115" b="32515"/>
+          <a:srcRect t="17373"/>
           <a:stretch>
             <a:fillRect/>
           </a:stretch>
         </p:blipFill>
         <p:spPr>
           <a:xfrm>
-            <a:off x="2457643" y="1773045"/>
-            <a:ext cx="7979899" cy="4214094"/>
+            <a:off x="2982712" y="1970314"/>
+            <a:ext cx="7151888" cy="3864429"/>
           </a:xfrm>
           <a:prstGeom prst="rect">
             <a:avLst/>

</xml_diff>